<commit_message>
update of Pyrad/Py-ART documentation
</commit_message>
<xml_diff>
--- a/doc/20160829_pyrad_architecture_fvj.pptx
+++ b/doc/20160829_pyrad_architecture_fvj.pptx
@@ -288,7 +288,7 @@
           <a:p>
             <a:fld id="{F0862444-C373-49AD-81EE-38228EABCA3B}" type="datetimeFigureOut">
               <a:rPr lang="en-US" smtClean="0"/>
-              <a:t>8/29/2016</a:t>
+              <a:t>2/7/2019</a:t>
             </a:fld>
             <a:endParaRPr lang="en-US"/>
           </a:p>
@@ -458,7 +458,7 @@
           <a:p>
             <a:fld id="{F0862444-C373-49AD-81EE-38228EABCA3B}" type="datetimeFigureOut">
               <a:rPr lang="en-US" smtClean="0"/>
-              <a:t>8/29/2016</a:t>
+              <a:t>2/7/2019</a:t>
             </a:fld>
             <a:endParaRPr lang="en-US"/>
           </a:p>
@@ -638,7 +638,7 @@
           <a:p>
             <a:fld id="{F0862444-C373-49AD-81EE-38228EABCA3B}" type="datetimeFigureOut">
               <a:rPr lang="en-US" smtClean="0"/>
-              <a:t>8/29/2016</a:t>
+              <a:t>2/7/2019</a:t>
             </a:fld>
             <a:endParaRPr lang="en-US"/>
           </a:p>
@@ -808,7 +808,7 @@
           <a:p>
             <a:fld id="{F0862444-C373-49AD-81EE-38228EABCA3B}" type="datetimeFigureOut">
               <a:rPr lang="en-US" smtClean="0"/>
-              <a:t>8/29/2016</a:t>
+              <a:t>2/7/2019</a:t>
             </a:fld>
             <a:endParaRPr lang="en-US"/>
           </a:p>
@@ -1054,7 +1054,7 @@
           <a:p>
             <a:fld id="{F0862444-C373-49AD-81EE-38228EABCA3B}" type="datetimeFigureOut">
               <a:rPr lang="en-US" smtClean="0"/>
-              <a:t>8/29/2016</a:t>
+              <a:t>2/7/2019</a:t>
             </a:fld>
             <a:endParaRPr lang="en-US"/>
           </a:p>
@@ -1342,7 +1342,7 @@
           <a:p>
             <a:fld id="{F0862444-C373-49AD-81EE-38228EABCA3B}" type="datetimeFigureOut">
               <a:rPr lang="en-US" smtClean="0"/>
-              <a:t>8/29/2016</a:t>
+              <a:t>2/7/2019</a:t>
             </a:fld>
             <a:endParaRPr lang="en-US"/>
           </a:p>
@@ -1764,7 +1764,7 @@
           <a:p>
             <a:fld id="{F0862444-C373-49AD-81EE-38228EABCA3B}" type="datetimeFigureOut">
               <a:rPr lang="en-US" smtClean="0"/>
-              <a:t>8/29/2016</a:t>
+              <a:t>2/7/2019</a:t>
             </a:fld>
             <a:endParaRPr lang="en-US"/>
           </a:p>
@@ -1882,7 +1882,7 @@
           <a:p>
             <a:fld id="{F0862444-C373-49AD-81EE-38228EABCA3B}" type="datetimeFigureOut">
               <a:rPr lang="en-US" smtClean="0"/>
-              <a:t>8/29/2016</a:t>
+              <a:t>2/7/2019</a:t>
             </a:fld>
             <a:endParaRPr lang="en-US"/>
           </a:p>
@@ -1977,7 +1977,7 @@
           <a:p>
             <a:fld id="{F0862444-C373-49AD-81EE-38228EABCA3B}" type="datetimeFigureOut">
               <a:rPr lang="en-US" smtClean="0"/>
-              <a:t>8/29/2016</a:t>
+              <a:t>2/7/2019</a:t>
             </a:fld>
             <a:endParaRPr lang="en-US"/>
           </a:p>
@@ -2254,7 +2254,7 @@
           <a:p>
             <a:fld id="{F0862444-C373-49AD-81EE-38228EABCA3B}" type="datetimeFigureOut">
               <a:rPr lang="en-US" smtClean="0"/>
-              <a:t>8/29/2016</a:t>
+              <a:t>2/7/2019</a:t>
             </a:fld>
             <a:endParaRPr lang="en-US"/>
           </a:p>
@@ -2507,7 +2507,7 @@
           <a:p>
             <a:fld id="{F0862444-C373-49AD-81EE-38228EABCA3B}" type="datetimeFigureOut">
               <a:rPr lang="en-US" smtClean="0"/>
-              <a:t>8/29/2016</a:t>
+              <a:t>2/7/2019</a:t>
             </a:fld>
             <a:endParaRPr lang="en-US"/>
           </a:p>
@@ -2720,7 +2720,7 @@
           <a:p>
             <a:fld id="{F0862444-C373-49AD-81EE-38228EABCA3B}" type="datetimeFigureOut">
               <a:rPr lang="en-US" smtClean="0"/>
-              <a:t>8/29/2016</a:t>
+              <a:t>2/7/2019</a:t>
             </a:fld>
             <a:endParaRPr lang="en-US"/>
           </a:p>
@@ -3097,16 +3097,16 @@
       </p:grpSpPr>
       <p:grpSp>
         <p:nvGrpSpPr>
-          <p:cNvPr id="59" name="Group 58"/>
+          <p:cNvPr id="18" name="Group 17"/>
           <p:cNvGrpSpPr/>
           <p:nvPr/>
         </p:nvGrpSpPr>
         <p:grpSpPr>
           <a:xfrm>
-            <a:off x="1403648" y="1667545"/>
-            <a:ext cx="5303061" cy="3920972"/>
-            <a:chOff x="1403648" y="1667545"/>
-            <a:chExt cx="5303061" cy="3920972"/>
+            <a:off x="1403648" y="1667544"/>
+            <a:ext cx="5303061" cy="4425751"/>
+            <a:chOff x="1403648" y="1667544"/>
+            <a:chExt cx="5303061" cy="4425751"/>
           </a:xfrm>
         </p:grpSpPr>
         <p:sp>
@@ -3774,8 +3774,8 @@
           </p:nvSpPr>
           <p:spPr>
             <a:xfrm>
-              <a:off x="3114912" y="4169133"/>
-              <a:ext cx="1152128" cy="723275"/>
+              <a:off x="3114912" y="4102832"/>
+              <a:ext cx="1152128" cy="892552"/>
             </a:xfrm>
             <a:prstGeom prst="rect">
               <a:avLst/>
@@ -3822,12 +3822,20 @@
             <a:p>
               <a:pPr algn="ctr"/>
               <a:r>
+                <a:rPr lang="en-US" sz="1100" dirty="0" smtClean="0">
+                  <a:solidFill>
+                    <a:srgbClr val="FF0000"/>
+                  </a:solidFill>
+                </a:rPr>
+                <a:t>Arm-</a:t>
+              </a:r>
+              <a:r>
                 <a:rPr lang="en-US" sz="1100" dirty="0" err="1" smtClean="0">
                   <a:solidFill>
                     <a:srgbClr val="FF0000"/>
                   </a:solidFill>
                 </a:rPr>
-                <a:t>Pyart</a:t>
+                <a:t>doe_bridge</a:t>
               </a:r>
               <a:endParaRPr lang="en-US" sz="1100" dirty="0" smtClean="0">
                 <a:solidFill>
@@ -3838,20 +3846,23 @@
             <a:p>
               <a:pPr algn="ctr"/>
               <a:r>
-                <a:rPr lang="en-US" sz="1100" dirty="0" err="1">
+                <a:rPr lang="en-US" sz="1100" dirty="0" smtClean="0">
                   <a:solidFill>
                     <a:schemeClr val="tx2"/>
                   </a:solidFill>
                 </a:rPr>
-                <a:t>p</a:t>
+                <a:t>Dev</a:t>
               </a:r>
+            </a:p>
+            <a:p>
+              <a:pPr algn="ctr"/>
               <a:r>
-                <a:rPr lang="en-US" sz="1100" dirty="0" err="1" smtClean="0">
+                <a:rPr lang="en-US" sz="1100" dirty="0" smtClean="0">
                   <a:solidFill>
                     <a:schemeClr val="tx2"/>
                   </a:solidFill>
                 </a:rPr>
-                <a:t>yart-mch</a:t>
+                <a:t>master</a:t>
               </a:r>
               <a:endParaRPr lang="en-US" sz="1100" dirty="0" smtClean="0">
                 <a:solidFill>
@@ -4106,8 +4117,8 @@
           </p:nvSpPr>
           <p:spPr>
             <a:xfrm>
-              <a:off x="1818768" y="1667545"/>
-              <a:ext cx="2736304" cy="3508232"/>
+              <a:off x="1818768" y="1667544"/>
+              <a:ext cx="2736304" cy="4425751"/>
             </a:xfrm>
             <a:prstGeom prst="roundRect">
               <a:avLst/>
@@ -4475,58 +4486,13 @@
         </p:sp>
         <p:sp>
           <p:nvSpPr>
-            <p:cNvPr id="61" name="Arc 60"/>
-            <p:cNvSpPr/>
-            <p:nvPr/>
-          </p:nvSpPr>
-          <p:spPr>
-            <a:xfrm>
-              <a:off x="3048226" y="4479543"/>
-              <a:ext cx="1035236" cy="196096"/>
-            </a:xfrm>
-            <a:prstGeom prst="arc">
-              <a:avLst>
-                <a:gd name="adj1" fmla="val 9187223"/>
-                <a:gd name="adj2" fmla="val 14124193"/>
-              </a:avLst>
-            </a:prstGeom>
-            <a:ln>
-              <a:headEnd type="triangle"/>
-              <a:tailEnd type="triangle"/>
-            </a:ln>
-          </p:spPr>
-          <p:style>
-            <a:lnRef idx="1">
-              <a:schemeClr val="accent1"/>
-            </a:lnRef>
-            <a:fillRef idx="0">
-              <a:schemeClr val="accent1"/>
-            </a:fillRef>
-            <a:effectRef idx="0">
-              <a:schemeClr val="accent1"/>
-            </a:effectRef>
-            <a:fontRef idx="minor">
-              <a:schemeClr val="tx1"/>
-            </a:fontRef>
-          </p:style>
-          <p:txBody>
-            <a:bodyPr rtlCol="0" anchor="ctr"/>
-            <a:lstStyle/>
-            <a:p>
-              <a:pPr algn="ctr"/>
-              <a:endParaRPr lang="en-US"/>
-            </a:p>
-          </p:txBody>
-        </p:sp>
-        <p:sp>
-          <p:nvSpPr>
             <p:cNvPr id="95" name="TextBox 94"/>
             <p:cNvSpPr txBox="1"/>
             <p:nvPr/>
           </p:nvSpPr>
           <p:spPr>
             <a:xfrm>
-              <a:off x="1403648" y="4465872"/>
+              <a:off x="1403648" y="4365104"/>
               <a:ext cx="1680268" cy="230832"/>
             </a:xfrm>
             <a:prstGeom prst="rect">
@@ -4542,11 +4508,7 @@
             <a:p>
               <a:r>
                 <a:rPr lang="en-US" sz="900" dirty="0" smtClean="0"/>
-                <a:t>branch/merge </a:t>
-              </a:r>
-              <a:r>
-                <a:rPr lang="en-US" sz="900" dirty="0" smtClean="0"/>
-                <a:t>relevant changes</a:t>
+                <a:t>branch/merge relevant changes</a:t>
               </a:r>
               <a:endParaRPr lang="en-US" sz="900" dirty="0"/>
             </a:p>
@@ -4562,8 +4524,8 @@
           </p:nvCxnSpPr>
           <p:spPr>
             <a:xfrm>
-              <a:off x="3869643" y="4479543"/>
-              <a:ext cx="1465231" cy="32773"/>
+              <a:off x="4211960" y="4479543"/>
+              <a:ext cx="1122914" cy="32773"/>
             </a:xfrm>
             <a:prstGeom prst="straightConnector1">
               <a:avLst/>
@@ -4612,11 +4574,7 @@
             <a:p>
               <a:r>
                 <a:rPr lang="en-US" sz="900" dirty="0" smtClean="0"/>
-                <a:t>f</a:t>
-              </a:r>
-              <a:r>
-                <a:rPr lang="en-US" sz="900" dirty="0" smtClean="0"/>
-                <a:t>ork/pull request</a:t>
+                <a:t>fork/pull request</a:t>
               </a:r>
               <a:endParaRPr lang="en-US" sz="900" dirty="0"/>
             </a:p>
@@ -4646,11 +4604,7 @@
             <a:p>
               <a:r>
                 <a:rPr lang="en-US" sz="1200" dirty="0" smtClean="0"/>
-                <a:t>g</a:t>
-              </a:r>
-              <a:r>
-                <a:rPr lang="en-US" sz="1200" dirty="0" smtClean="0"/>
-                <a:t>ithub.com/</a:t>
+                <a:t>github.com/</a:t>
               </a:r>
               <a:r>
                 <a:rPr lang="en-US" sz="1200" dirty="0" err="1" smtClean="0"/>
@@ -4687,6 +4641,243 @@
                 <a:t>github.com</a:t>
               </a:r>
               <a:endParaRPr lang="en-US" sz="1200" dirty="0"/>
+            </a:p>
+          </p:txBody>
+        </p:sp>
+        <p:cxnSp>
+          <p:nvCxnSpPr>
+            <p:cNvPr id="4" name="Elbow Connector 3"/>
+            <p:cNvCxnSpPr/>
+            <p:nvPr/>
+          </p:nvCxnSpPr>
+          <p:spPr>
+            <a:xfrm>
+              <a:off x="3186920" y="4434628"/>
+              <a:ext cx="376968" cy="142963"/>
+            </a:xfrm>
+            <a:prstGeom prst="bentConnector3">
+              <a:avLst>
+                <a:gd name="adj1" fmla="val -36337"/>
+              </a:avLst>
+            </a:prstGeom>
+            <a:ln>
+              <a:tailEnd type="arrow"/>
+            </a:ln>
+          </p:spPr>
+          <p:style>
+            <a:lnRef idx="1">
+              <a:schemeClr val="accent1"/>
+            </a:lnRef>
+            <a:fillRef idx="0">
+              <a:schemeClr val="accent1"/>
+            </a:fillRef>
+            <a:effectRef idx="0">
+              <a:schemeClr val="accent1"/>
+            </a:effectRef>
+            <a:fontRef idx="minor">
+              <a:schemeClr val="tx1"/>
+            </a:fontRef>
+          </p:style>
+        </p:cxnSp>
+        <p:sp>
+          <p:nvSpPr>
+            <p:cNvPr id="17" name="TextBox 16"/>
+            <p:cNvSpPr txBox="1"/>
+            <p:nvPr/>
+          </p:nvSpPr>
+          <p:spPr>
+            <a:xfrm>
+              <a:off x="1901700" y="2005351"/>
+              <a:ext cx="593432" cy="430887"/>
+            </a:xfrm>
+            <a:prstGeom prst="rect">
+              <a:avLst/>
+            </a:prstGeom>
+            <a:noFill/>
+          </p:spPr>
+          <p:txBody>
+            <a:bodyPr wrap="none" rtlCol="0">
+              <a:spAutoFit/>
+            </a:bodyPr>
+            <a:lstStyle/>
+            <a:p>
+              <a:r>
+                <a:rPr lang="en-GB" sz="1100" dirty="0" smtClean="0">
+                  <a:solidFill>
+                    <a:schemeClr val="accent1"/>
+                  </a:solidFill>
+                </a:rPr>
+                <a:t>Master</a:t>
+              </a:r>
+            </a:p>
+            <a:p>
+              <a:r>
+                <a:rPr lang="en-GB" sz="1100" dirty="0" smtClean="0">
+                  <a:solidFill>
+                    <a:schemeClr val="accent1"/>
+                  </a:solidFill>
+                </a:rPr>
+                <a:t>Dev</a:t>
+              </a:r>
+              <a:endParaRPr lang="en-GB" sz="1100" dirty="0">
+                <a:solidFill>
+                  <a:schemeClr val="accent1"/>
+                </a:solidFill>
+              </a:endParaRPr>
+            </a:p>
+          </p:txBody>
+        </p:sp>
+        <p:sp>
+          <p:nvSpPr>
+            <p:cNvPr id="52" name="Rounded Rectangle 51"/>
+            <p:cNvSpPr/>
+            <p:nvPr/>
+          </p:nvSpPr>
+          <p:spPr>
+            <a:xfrm>
+              <a:off x="2577125" y="5070507"/>
+              <a:ext cx="1797927" cy="374718"/>
+            </a:xfrm>
+            <a:prstGeom prst="roundRect">
+              <a:avLst/>
+            </a:prstGeom>
+            <a:noFill/>
+          </p:spPr>
+          <p:style>
+            <a:lnRef idx="2">
+              <a:schemeClr val="accent1">
+                <a:shade val="50000"/>
+              </a:schemeClr>
+            </a:lnRef>
+            <a:fillRef idx="1">
+              <a:schemeClr val="accent1"/>
+            </a:fillRef>
+            <a:effectRef idx="0">
+              <a:schemeClr val="accent1"/>
+            </a:effectRef>
+            <a:fontRef idx="minor">
+              <a:schemeClr val="lt1"/>
+            </a:fontRef>
+          </p:style>
+          <p:txBody>
+            <a:bodyPr rtlCol="0" anchor="ctr"/>
+            <a:lstStyle/>
+            <a:p>
+              <a:pPr algn="ctr"/>
+              <a:r>
+                <a:rPr lang="en-US" sz="1400" dirty="0" smtClean="0">
+                  <a:solidFill>
+                    <a:schemeClr val="tx1"/>
+                  </a:solidFill>
+                </a:rPr>
+                <a:t>tools</a:t>
+              </a:r>
+              <a:endParaRPr lang="en-US" sz="1400" dirty="0">
+                <a:solidFill>
+                  <a:schemeClr val="tx1"/>
+                </a:solidFill>
+              </a:endParaRPr>
+            </a:p>
+          </p:txBody>
+        </p:sp>
+        <p:sp>
+          <p:nvSpPr>
+            <p:cNvPr id="53" name="Rounded Rectangle 52"/>
+            <p:cNvSpPr/>
+            <p:nvPr/>
+          </p:nvSpPr>
+          <p:spPr>
+            <a:xfrm>
+              <a:off x="2538028" y="5517232"/>
+              <a:ext cx="1817948" cy="507263"/>
+            </a:xfrm>
+            <a:prstGeom prst="roundRect">
+              <a:avLst/>
+            </a:prstGeom>
+            <a:noFill/>
+          </p:spPr>
+          <p:style>
+            <a:lnRef idx="2">
+              <a:schemeClr val="accent1">
+                <a:shade val="50000"/>
+              </a:schemeClr>
+            </a:lnRef>
+            <a:fillRef idx="1">
+              <a:schemeClr val="accent1"/>
+            </a:fillRef>
+            <a:effectRef idx="0">
+              <a:schemeClr val="accent1"/>
+            </a:effectRef>
+            <a:fontRef idx="minor">
+              <a:schemeClr val="lt1"/>
+            </a:fontRef>
+          </p:style>
+          <p:txBody>
+            <a:bodyPr rtlCol="0" anchor="ctr"/>
+            <a:lstStyle/>
+            <a:p>
+              <a:pPr algn="ctr"/>
+              <a:endParaRPr lang="en-US"/>
+            </a:p>
+          </p:txBody>
+        </p:sp>
+        <p:sp>
+          <p:nvSpPr>
+            <p:cNvPr id="54" name="TextBox 53"/>
+            <p:cNvSpPr txBox="1"/>
+            <p:nvPr/>
+          </p:nvSpPr>
+          <p:spPr>
+            <a:xfrm>
+              <a:off x="2657798" y="5616974"/>
+              <a:ext cx="519694" cy="307777"/>
+            </a:xfrm>
+            <a:prstGeom prst="rect">
+              <a:avLst/>
+            </a:prstGeom>
+            <a:noFill/>
+          </p:spPr>
+          <p:txBody>
+            <a:bodyPr wrap="none" rtlCol="0">
+              <a:spAutoFit/>
+            </a:bodyPr>
+            <a:lstStyle/>
+            <a:p>
+              <a:r>
+                <a:rPr lang="en-US" sz="1400" dirty="0" smtClean="0"/>
+                <a:t>docs</a:t>
+              </a:r>
+              <a:endParaRPr lang="en-US" sz="1400" dirty="0"/>
+            </a:p>
+          </p:txBody>
+        </p:sp>
+        <p:sp>
+          <p:nvSpPr>
+            <p:cNvPr id="55" name="TextBox 54"/>
+            <p:cNvSpPr txBox="1"/>
+            <p:nvPr/>
+          </p:nvSpPr>
+          <p:spPr>
+            <a:xfrm>
+              <a:off x="3131840" y="5661828"/>
+              <a:ext cx="1127232" cy="215444"/>
+            </a:xfrm>
+            <a:prstGeom prst="rect">
+              <a:avLst/>
+            </a:prstGeom>
+            <a:noFill/>
+          </p:spPr>
+          <p:txBody>
+            <a:bodyPr wrap="none" rtlCol="0">
+              <a:spAutoFit/>
+            </a:bodyPr>
+            <a:lstStyle/>
+            <a:p>
+              <a:r>
+                <a:rPr lang="en-US" sz="800" dirty="0" smtClean="0"/>
+                <a:t>Online documentation</a:t>
+              </a:r>
+              <a:endParaRPr lang="en-US" sz="800" dirty="0"/>
             </a:p>
           </p:txBody>
         </p:sp>

</xml_diff>

<commit_message>
update of documentation in dev branch
</commit_message>
<xml_diff>
--- a/doc/20160829_pyrad_architecture_fvj.pptx
+++ b/doc/20160829_pyrad_architecture_fvj.pptx
@@ -288,7 +288,7 @@
           <a:p>
             <a:fld id="{F0862444-C373-49AD-81EE-38228EABCA3B}" type="datetimeFigureOut">
               <a:rPr lang="en-US" smtClean="0"/>
-              <a:t>8/29/2016</a:t>
+              <a:t>2/7/2019</a:t>
             </a:fld>
             <a:endParaRPr lang="en-US"/>
           </a:p>
@@ -458,7 +458,7 @@
           <a:p>
             <a:fld id="{F0862444-C373-49AD-81EE-38228EABCA3B}" type="datetimeFigureOut">
               <a:rPr lang="en-US" smtClean="0"/>
-              <a:t>8/29/2016</a:t>
+              <a:t>2/7/2019</a:t>
             </a:fld>
             <a:endParaRPr lang="en-US"/>
           </a:p>
@@ -638,7 +638,7 @@
           <a:p>
             <a:fld id="{F0862444-C373-49AD-81EE-38228EABCA3B}" type="datetimeFigureOut">
               <a:rPr lang="en-US" smtClean="0"/>
-              <a:t>8/29/2016</a:t>
+              <a:t>2/7/2019</a:t>
             </a:fld>
             <a:endParaRPr lang="en-US"/>
           </a:p>
@@ -808,7 +808,7 @@
           <a:p>
             <a:fld id="{F0862444-C373-49AD-81EE-38228EABCA3B}" type="datetimeFigureOut">
               <a:rPr lang="en-US" smtClean="0"/>
-              <a:t>8/29/2016</a:t>
+              <a:t>2/7/2019</a:t>
             </a:fld>
             <a:endParaRPr lang="en-US"/>
           </a:p>
@@ -1054,7 +1054,7 @@
           <a:p>
             <a:fld id="{F0862444-C373-49AD-81EE-38228EABCA3B}" type="datetimeFigureOut">
               <a:rPr lang="en-US" smtClean="0"/>
-              <a:t>8/29/2016</a:t>
+              <a:t>2/7/2019</a:t>
             </a:fld>
             <a:endParaRPr lang="en-US"/>
           </a:p>
@@ -1342,7 +1342,7 @@
           <a:p>
             <a:fld id="{F0862444-C373-49AD-81EE-38228EABCA3B}" type="datetimeFigureOut">
               <a:rPr lang="en-US" smtClean="0"/>
-              <a:t>8/29/2016</a:t>
+              <a:t>2/7/2019</a:t>
             </a:fld>
             <a:endParaRPr lang="en-US"/>
           </a:p>
@@ -1764,7 +1764,7 @@
           <a:p>
             <a:fld id="{F0862444-C373-49AD-81EE-38228EABCA3B}" type="datetimeFigureOut">
               <a:rPr lang="en-US" smtClean="0"/>
-              <a:t>8/29/2016</a:t>
+              <a:t>2/7/2019</a:t>
             </a:fld>
             <a:endParaRPr lang="en-US"/>
           </a:p>
@@ -1882,7 +1882,7 @@
           <a:p>
             <a:fld id="{F0862444-C373-49AD-81EE-38228EABCA3B}" type="datetimeFigureOut">
               <a:rPr lang="en-US" smtClean="0"/>
-              <a:t>8/29/2016</a:t>
+              <a:t>2/7/2019</a:t>
             </a:fld>
             <a:endParaRPr lang="en-US"/>
           </a:p>
@@ -1977,7 +1977,7 @@
           <a:p>
             <a:fld id="{F0862444-C373-49AD-81EE-38228EABCA3B}" type="datetimeFigureOut">
               <a:rPr lang="en-US" smtClean="0"/>
-              <a:t>8/29/2016</a:t>
+              <a:t>2/7/2019</a:t>
             </a:fld>
             <a:endParaRPr lang="en-US"/>
           </a:p>
@@ -2254,7 +2254,7 @@
           <a:p>
             <a:fld id="{F0862444-C373-49AD-81EE-38228EABCA3B}" type="datetimeFigureOut">
               <a:rPr lang="en-US" smtClean="0"/>
-              <a:t>8/29/2016</a:t>
+              <a:t>2/7/2019</a:t>
             </a:fld>
             <a:endParaRPr lang="en-US"/>
           </a:p>
@@ -2507,7 +2507,7 @@
           <a:p>
             <a:fld id="{F0862444-C373-49AD-81EE-38228EABCA3B}" type="datetimeFigureOut">
               <a:rPr lang="en-US" smtClean="0"/>
-              <a:t>8/29/2016</a:t>
+              <a:t>2/7/2019</a:t>
             </a:fld>
             <a:endParaRPr lang="en-US"/>
           </a:p>
@@ -2720,7 +2720,7 @@
           <a:p>
             <a:fld id="{F0862444-C373-49AD-81EE-38228EABCA3B}" type="datetimeFigureOut">
               <a:rPr lang="en-US" smtClean="0"/>
-              <a:t>8/29/2016</a:t>
+              <a:t>2/7/2019</a:t>
             </a:fld>
             <a:endParaRPr lang="en-US"/>
           </a:p>
@@ -3097,16 +3097,16 @@
       </p:grpSpPr>
       <p:grpSp>
         <p:nvGrpSpPr>
-          <p:cNvPr id="59" name="Group 58"/>
+          <p:cNvPr id="18" name="Group 17"/>
           <p:cNvGrpSpPr/>
           <p:nvPr/>
         </p:nvGrpSpPr>
         <p:grpSpPr>
           <a:xfrm>
-            <a:off x="1403648" y="1667545"/>
-            <a:ext cx="5303061" cy="3920972"/>
-            <a:chOff x="1403648" y="1667545"/>
-            <a:chExt cx="5303061" cy="3920972"/>
+            <a:off x="1403648" y="1667544"/>
+            <a:ext cx="5303061" cy="4425751"/>
+            <a:chOff x="1403648" y="1667544"/>
+            <a:chExt cx="5303061" cy="4425751"/>
           </a:xfrm>
         </p:grpSpPr>
         <p:sp>
@@ -3774,8 +3774,8 @@
           </p:nvSpPr>
           <p:spPr>
             <a:xfrm>
-              <a:off x="3114912" y="4169133"/>
-              <a:ext cx="1152128" cy="723275"/>
+              <a:off x="3114912" y="4102832"/>
+              <a:ext cx="1152128" cy="892552"/>
             </a:xfrm>
             <a:prstGeom prst="rect">
               <a:avLst/>
@@ -3822,12 +3822,20 @@
             <a:p>
               <a:pPr algn="ctr"/>
               <a:r>
+                <a:rPr lang="en-US" sz="1100" dirty="0" smtClean="0">
+                  <a:solidFill>
+                    <a:srgbClr val="FF0000"/>
+                  </a:solidFill>
+                </a:rPr>
+                <a:t>Arm-</a:t>
+              </a:r>
+              <a:r>
                 <a:rPr lang="en-US" sz="1100" dirty="0" err="1" smtClean="0">
                   <a:solidFill>
                     <a:srgbClr val="FF0000"/>
                   </a:solidFill>
                 </a:rPr>
-                <a:t>Pyart</a:t>
+                <a:t>doe_bridge</a:t>
               </a:r>
               <a:endParaRPr lang="en-US" sz="1100" dirty="0" smtClean="0">
                 <a:solidFill>
@@ -3838,20 +3846,23 @@
             <a:p>
               <a:pPr algn="ctr"/>
               <a:r>
-                <a:rPr lang="en-US" sz="1100" dirty="0" err="1">
+                <a:rPr lang="en-US" sz="1100" dirty="0" smtClean="0">
                   <a:solidFill>
                     <a:schemeClr val="tx2"/>
                   </a:solidFill>
                 </a:rPr>
-                <a:t>p</a:t>
+                <a:t>Dev</a:t>
               </a:r>
+            </a:p>
+            <a:p>
+              <a:pPr algn="ctr"/>
               <a:r>
-                <a:rPr lang="en-US" sz="1100" dirty="0" err="1" smtClean="0">
+                <a:rPr lang="en-US" sz="1100" dirty="0" smtClean="0">
                   <a:solidFill>
                     <a:schemeClr val="tx2"/>
                   </a:solidFill>
                 </a:rPr>
-                <a:t>yart-mch</a:t>
+                <a:t>master</a:t>
               </a:r>
               <a:endParaRPr lang="en-US" sz="1100" dirty="0" smtClean="0">
                 <a:solidFill>
@@ -4106,8 +4117,8 @@
           </p:nvSpPr>
           <p:spPr>
             <a:xfrm>
-              <a:off x="1818768" y="1667545"/>
-              <a:ext cx="2736304" cy="3508232"/>
+              <a:off x="1818768" y="1667544"/>
+              <a:ext cx="2736304" cy="4425751"/>
             </a:xfrm>
             <a:prstGeom prst="roundRect">
               <a:avLst/>
@@ -4475,58 +4486,13 @@
         </p:sp>
         <p:sp>
           <p:nvSpPr>
-            <p:cNvPr id="61" name="Arc 60"/>
-            <p:cNvSpPr/>
-            <p:nvPr/>
-          </p:nvSpPr>
-          <p:spPr>
-            <a:xfrm>
-              <a:off x="3048226" y="4479543"/>
-              <a:ext cx="1035236" cy="196096"/>
-            </a:xfrm>
-            <a:prstGeom prst="arc">
-              <a:avLst>
-                <a:gd name="adj1" fmla="val 9187223"/>
-                <a:gd name="adj2" fmla="val 14124193"/>
-              </a:avLst>
-            </a:prstGeom>
-            <a:ln>
-              <a:headEnd type="triangle"/>
-              <a:tailEnd type="triangle"/>
-            </a:ln>
-          </p:spPr>
-          <p:style>
-            <a:lnRef idx="1">
-              <a:schemeClr val="accent1"/>
-            </a:lnRef>
-            <a:fillRef idx="0">
-              <a:schemeClr val="accent1"/>
-            </a:fillRef>
-            <a:effectRef idx="0">
-              <a:schemeClr val="accent1"/>
-            </a:effectRef>
-            <a:fontRef idx="minor">
-              <a:schemeClr val="tx1"/>
-            </a:fontRef>
-          </p:style>
-          <p:txBody>
-            <a:bodyPr rtlCol="0" anchor="ctr"/>
-            <a:lstStyle/>
-            <a:p>
-              <a:pPr algn="ctr"/>
-              <a:endParaRPr lang="en-US"/>
-            </a:p>
-          </p:txBody>
-        </p:sp>
-        <p:sp>
-          <p:nvSpPr>
             <p:cNvPr id="95" name="TextBox 94"/>
             <p:cNvSpPr txBox="1"/>
             <p:nvPr/>
           </p:nvSpPr>
           <p:spPr>
             <a:xfrm>
-              <a:off x="1403648" y="4465872"/>
+              <a:off x="1403648" y="4365104"/>
               <a:ext cx="1680268" cy="230832"/>
             </a:xfrm>
             <a:prstGeom prst="rect">
@@ -4542,11 +4508,7 @@
             <a:p>
               <a:r>
                 <a:rPr lang="en-US" sz="900" dirty="0" smtClean="0"/>
-                <a:t>branch/merge </a:t>
-              </a:r>
-              <a:r>
-                <a:rPr lang="en-US" sz="900" dirty="0" smtClean="0"/>
-                <a:t>relevant changes</a:t>
+                <a:t>branch/merge relevant changes</a:t>
               </a:r>
               <a:endParaRPr lang="en-US" sz="900" dirty="0"/>
             </a:p>
@@ -4562,8 +4524,8 @@
           </p:nvCxnSpPr>
           <p:spPr>
             <a:xfrm>
-              <a:off x="3869643" y="4479543"/>
-              <a:ext cx="1465231" cy="32773"/>
+              <a:off x="4211960" y="4479543"/>
+              <a:ext cx="1122914" cy="32773"/>
             </a:xfrm>
             <a:prstGeom prst="straightConnector1">
               <a:avLst/>
@@ -4612,11 +4574,7 @@
             <a:p>
               <a:r>
                 <a:rPr lang="en-US" sz="900" dirty="0" smtClean="0"/>
-                <a:t>f</a:t>
-              </a:r>
-              <a:r>
-                <a:rPr lang="en-US" sz="900" dirty="0" smtClean="0"/>
-                <a:t>ork/pull request</a:t>
+                <a:t>fork/pull request</a:t>
               </a:r>
               <a:endParaRPr lang="en-US" sz="900" dirty="0"/>
             </a:p>
@@ -4646,11 +4604,7 @@
             <a:p>
               <a:r>
                 <a:rPr lang="en-US" sz="1200" dirty="0" smtClean="0"/>
-                <a:t>g</a:t>
-              </a:r>
-              <a:r>
-                <a:rPr lang="en-US" sz="1200" dirty="0" smtClean="0"/>
-                <a:t>ithub.com/</a:t>
+                <a:t>github.com/</a:t>
               </a:r>
               <a:r>
                 <a:rPr lang="en-US" sz="1200" dirty="0" err="1" smtClean="0"/>
@@ -4687,6 +4641,243 @@
                 <a:t>github.com</a:t>
               </a:r>
               <a:endParaRPr lang="en-US" sz="1200" dirty="0"/>
+            </a:p>
+          </p:txBody>
+        </p:sp>
+        <p:cxnSp>
+          <p:nvCxnSpPr>
+            <p:cNvPr id="4" name="Elbow Connector 3"/>
+            <p:cNvCxnSpPr/>
+            <p:nvPr/>
+          </p:nvCxnSpPr>
+          <p:spPr>
+            <a:xfrm>
+              <a:off x="3186920" y="4434628"/>
+              <a:ext cx="376968" cy="142963"/>
+            </a:xfrm>
+            <a:prstGeom prst="bentConnector3">
+              <a:avLst>
+                <a:gd name="adj1" fmla="val -36337"/>
+              </a:avLst>
+            </a:prstGeom>
+            <a:ln>
+              <a:tailEnd type="arrow"/>
+            </a:ln>
+          </p:spPr>
+          <p:style>
+            <a:lnRef idx="1">
+              <a:schemeClr val="accent1"/>
+            </a:lnRef>
+            <a:fillRef idx="0">
+              <a:schemeClr val="accent1"/>
+            </a:fillRef>
+            <a:effectRef idx="0">
+              <a:schemeClr val="accent1"/>
+            </a:effectRef>
+            <a:fontRef idx="minor">
+              <a:schemeClr val="tx1"/>
+            </a:fontRef>
+          </p:style>
+        </p:cxnSp>
+        <p:sp>
+          <p:nvSpPr>
+            <p:cNvPr id="17" name="TextBox 16"/>
+            <p:cNvSpPr txBox="1"/>
+            <p:nvPr/>
+          </p:nvSpPr>
+          <p:spPr>
+            <a:xfrm>
+              <a:off x="1901700" y="2005351"/>
+              <a:ext cx="593432" cy="430887"/>
+            </a:xfrm>
+            <a:prstGeom prst="rect">
+              <a:avLst/>
+            </a:prstGeom>
+            <a:noFill/>
+          </p:spPr>
+          <p:txBody>
+            <a:bodyPr wrap="none" rtlCol="0">
+              <a:spAutoFit/>
+            </a:bodyPr>
+            <a:lstStyle/>
+            <a:p>
+              <a:r>
+                <a:rPr lang="en-GB" sz="1100" dirty="0" smtClean="0">
+                  <a:solidFill>
+                    <a:schemeClr val="accent1"/>
+                  </a:solidFill>
+                </a:rPr>
+                <a:t>Master</a:t>
+              </a:r>
+            </a:p>
+            <a:p>
+              <a:r>
+                <a:rPr lang="en-GB" sz="1100" dirty="0" smtClean="0">
+                  <a:solidFill>
+                    <a:schemeClr val="accent1"/>
+                  </a:solidFill>
+                </a:rPr>
+                <a:t>Dev</a:t>
+              </a:r>
+              <a:endParaRPr lang="en-GB" sz="1100" dirty="0">
+                <a:solidFill>
+                  <a:schemeClr val="accent1"/>
+                </a:solidFill>
+              </a:endParaRPr>
+            </a:p>
+          </p:txBody>
+        </p:sp>
+        <p:sp>
+          <p:nvSpPr>
+            <p:cNvPr id="52" name="Rounded Rectangle 51"/>
+            <p:cNvSpPr/>
+            <p:nvPr/>
+          </p:nvSpPr>
+          <p:spPr>
+            <a:xfrm>
+              <a:off x="2577125" y="5070507"/>
+              <a:ext cx="1797927" cy="374718"/>
+            </a:xfrm>
+            <a:prstGeom prst="roundRect">
+              <a:avLst/>
+            </a:prstGeom>
+            <a:noFill/>
+          </p:spPr>
+          <p:style>
+            <a:lnRef idx="2">
+              <a:schemeClr val="accent1">
+                <a:shade val="50000"/>
+              </a:schemeClr>
+            </a:lnRef>
+            <a:fillRef idx="1">
+              <a:schemeClr val="accent1"/>
+            </a:fillRef>
+            <a:effectRef idx="0">
+              <a:schemeClr val="accent1"/>
+            </a:effectRef>
+            <a:fontRef idx="minor">
+              <a:schemeClr val="lt1"/>
+            </a:fontRef>
+          </p:style>
+          <p:txBody>
+            <a:bodyPr rtlCol="0" anchor="ctr"/>
+            <a:lstStyle/>
+            <a:p>
+              <a:pPr algn="ctr"/>
+              <a:r>
+                <a:rPr lang="en-US" sz="1400" dirty="0" smtClean="0">
+                  <a:solidFill>
+                    <a:schemeClr val="tx1"/>
+                  </a:solidFill>
+                </a:rPr>
+                <a:t>tools</a:t>
+              </a:r>
+              <a:endParaRPr lang="en-US" sz="1400" dirty="0">
+                <a:solidFill>
+                  <a:schemeClr val="tx1"/>
+                </a:solidFill>
+              </a:endParaRPr>
+            </a:p>
+          </p:txBody>
+        </p:sp>
+        <p:sp>
+          <p:nvSpPr>
+            <p:cNvPr id="53" name="Rounded Rectangle 52"/>
+            <p:cNvSpPr/>
+            <p:nvPr/>
+          </p:nvSpPr>
+          <p:spPr>
+            <a:xfrm>
+              <a:off x="2538028" y="5517232"/>
+              <a:ext cx="1817948" cy="507263"/>
+            </a:xfrm>
+            <a:prstGeom prst="roundRect">
+              <a:avLst/>
+            </a:prstGeom>
+            <a:noFill/>
+          </p:spPr>
+          <p:style>
+            <a:lnRef idx="2">
+              <a:schemeClr val="accent1">
+                <a:shade val="50000"/>
+              </a:schemeClr>
+            </a:lnRef>
+            <a:fillRef idx="1">
+              <a:schemeClr val="accent1"/>
+            </a:fillRef>
+            <a:effectRef idx="0">
+              <a:schemeClr val="accent1"/>
+            </a:effectRef>
+            <a:fontRef idx="minor">
+              <a:schemeClr val="lt1"/>
+            </a:fontRef>
+          </p:style>
+          <p:txBody>
+            <a:bodyPr rtlCol="0" anchor="ctr"/>
+            <a:lstStyle/>
+            <a:p>
+              <a:pPr algn="ctr"/>
+              <a:endParaRPr lang="en-US"/>
+            </a:p>
+          </p:txBody>
+        </p:sp>
+        <p:sp>
+          <p:nvSpPr>
+            <p:cNvPr id="54" name="TextBox 53"/>
+            <p:cNvSpPr txBox="1"/>
+            <p:nvPr/>
+          </p:nvSpPr>
+          <p:spPr>
+            <a:xfrm>
+              <a:off x="2657798" y="5616974"/>
+              <a:ext cx="519694" cy="307777"/>
+            </a:xfrm>
+            <a:prstGeom prst="rect">
+              <a:avLst/>
+            </a:prstGeom>
+            <a:noFill/>
+          </p:spPr>
+          <p:txBody>
+            <a:bodyPr wrap="none" rtlCol="0">
+              <a:spAutoFit/>
+            </a:bodyPr>
+            <a:lstStyle/>
+            <a:p>
+              <a:r>
+                <a:rPr lang="en-US" sz="1400" dirty="0" smtClean="0"/>
+                <a:t>docs</a:t>
+              </a:r>
+              <a:endParaRPr lang="en-US" sz="1400" dirty="0"/>
+            </a:p>
+          </p:txBody>
+        </p:sp>
+        <p:sp>
+          <p:nvSpPr>
+            <p:cNvPr id="55" name="TextBox 54"/>
+            <p:cNvSpPr txBox="1"/>
+            <p:nvPr/>
+          </p:nvSpPr>
+          <p:spPr>
+            <a:xfrm>
+              <a:off x="3131840" y="5661828"/>
+              <a:ext cx="1127232" cy="215444"/>
+            </a:xfrm>
+            <a:prstGeom prst="rect">
+              <a:avLst/>
+            </a:prstGeom>
+            <a:noFill/>
+          </p:spPr>
+          <p:txBody>
+            <a:bodyPr wrap="none" rtlCol="0">
+              <a:spAutoFit/>
+            </a:bodyPr>
+            <a:lstStyle/>
+            <a:p>
+              <a:r>
+                <a:rPr lang="en-US" sz="800" dirty="0" smtClean="0"/>
+                <a:t>Online documentation</a:t>
+              </a:r>
+              <a:endParaRPr lang="en-US" sz="800" dirty="0"/>
             </a:p>
           </p:txBody>
         </p:sp>

</xml_diff>